<commit_message>
Scale columns proportionally when duplicating
</commit_message>
<xml_diff>
--- a/test/ShapeCrawler.Tests.Unit/Assets/tables/table-case003.pptx
+++ b/test/ShapeCrawler.Tests.Unit/Assets/tables/table-case003.pptx
@@ -259,7 +259,7 @@
           <a:p>
             <a:fld id="{7DB04C1E-DC2A-45DF-9C25-8496FC229A27}" type="datetimeFigureOut">
               <a:rPr lang="en-US" smtClean="0"/>
-              <a:t>1/19/25</a:t>
+              <a:t>1/24/25</a:t>
             </a:fld>
             <a:endParaRPr lang="en-US"/>
           </a:p>
@@ -457,7 +457,7 @@
           <a:p>
             <a:fld id="{7DB04C1E-DC2A-45DF-9C25-8496FC229A27}" type="datetimeFigureOut">
               <a:rPr lang="en-US" smtClean="0"/>
-              <a:t>1/19/25</a:t>
+              <a:t>1/24/25</a:t>
             </a:fld>
             <a:endParaRPr lang="en-US"/>
           </a:p>
@@ -665,7 +665,7 @@
           <a:p>
             <a:fld id="{7DB04C1E-DC2A-45DF-9C25-8496FC229A27}" type="datetimeFigureOut">
               <a:rPr lang="en-US" smtClean="0"/>
-              <a:t>1/19/25</a:t>
+              <a:t>1/24/25</a:t>
             </a:fld>
             <a:endParaRPr lang="en-US"/>
           </a:p>
@@ -863,7 +863,7 @@
           <a:p>
             <a:fld id="{7DB04C1E-DC2A-45DF-9C25-8496FC229A27}" type="datetimeFigureOut">
               <a:rPr lang="en-US" smtClean="0"/>
-              <a:t>1/19/25</a:t>
+              <a:t>1/24/25</a:t>
             </a:fld>
             <a:endParaRPr lang="en-US"/>
           </a:p>
@@ -1138,7 +1138,7 @@
           <a:p>
             <a:fld id="{7DB04C1E-DC2A-45DF-9C25-8496FC229A27}" type="datetimeFigureOut">
               <a:rPr lang="en-US" smtClean="0"/>
-              <a:t>1/19/25</a:t>
+              <a:t>1/24/25</a:t>
             </a:fld>
             <a:endParaRPr lang="en-US"/>
           </a:p>
@@ -1403,7 +1403,7 @@
           <a:p>
             <a:fld id="{7DB04C1E-DC2A-45DF-9C25-8496FC229A27}" type="datetimeFigureOut">
               <a:rPr lang="en-US" smtClean="0"/>
-              <a:t>1/19/25</a:t>
+              <a:t>1/24/25</a:t>
             </a:fld>
             <a:endParaRPr lang="en-US"/>
           </a:p>
@@ -1815,7 +1815,7 @@
           <a:p>
             <a:fld id="{7DB04C1E-DC2A-45DF-9C25-8496FC229A27}" type="datetimeFigureOut">
               <a:rPr lang="en-US" smtClean="0"/>
-              <a:t>1/19/25</a:t>
+              <a:t>1/24/25</a:t>
             </a:fld>
             <a:endParaRPr lang="en-US"/>
           </a:p>
@@ -1956,7 +1956,7 @@
           <a:p>
             <a:fld id="{7DB04C1E-DC2A-45DF-9C25-8496FC229A27}" type="datetimeFigureOut">
               <a:rPr lang="en-US" smtClean="0"/>
-              <a:t>1/19/25</a:t>
+              <a:t>1/24/25</a:t>
             </a:fld>
             <a:endParaRPr lang="en-US"/>
           </a:p>
@@ -2069,7 +2069,7 @@
           <a:p>
             <a:fld id="{7DB04C1E-DC2A-45DF-9C25-8496FC229A27}" type="datetimeFigureOut">
               <a:rPr lang="en-US" smtClean="0"/>
-              <a:t>1/19/25</a:t>
+              <a:t>1/24/25</a:t>
             </a:fld>
             <a:endParaRPr lang="en-US"/>
           </a:p>
@@ -2380,7 +2380,7 @@
           <a:p>
             <a:fld id="{7DB04C1E-DC2A-45DF-9C25-8496FC229A27}" type="datetimeFigureOut">
               <a:rPr lang="en-US" smtClean="0"/>
-              <a:t>1/19/25</a:t>
+              <a:t>1/24/25</a:t>
             </a:fld>
             <a:endParaRPr lang="en-US"/>
           </a:p>
@@ -2668,7 +2668,7 @@
           <a:p>
             <a:fld id="{7DB04C1E-DC2A-45DF-9C25-8496FC229A27}" type="datetimeFigureOut">
               <a:rPr lang="en-US" smtClean="0"/>
-              <a:t>1/19/25</a:t>
+              <a:t>1/24/25</a:t>
             </a:fld>
             <a:endParaRPr lang="en-US"/>
           </a:p>
@@ -2909,7 +2909,7 @@
           <a:p>
             <a:fld id="{7DB04C1E-DC2A-45DF-9C25-8496FC229A27}" type="datetimeFigureOut">
               <a:rPr lang="en-US" smtClean="0"/>
-              <a:t>1/19/25</a:t>
+              <a:t>1/24/25</a:t>
             </a:fld>
             <a:endParaRPr lang="en-US"/>
           </a:p>
@@ -3341,7 +3341,7 @@
           <p:nvPr>
             <p:extLst>
               <p:ext uri="{D42A27DB-BD31-4B8C-83A1-F6EECF244321}">
-                <p14:modId xmlns:p14="http://schemas.microsoft.com/office/powerpoint/2010/main" val="2763163127"/>
+                <p14:modId xmlns:p14="http://schemas.microsoft.com/office/powerpoint/2010/main" val="708280704"/>
               </p:ext>
             </p:extLst>
           </p:nvPr>
@@ -3357,21 +3357,21 @@
                 <a:tableStyleId>{5C22544A-7EE6-4342-B048-85BDC9FD1C3A}</a:tableStyleId>
               </a:tblPr>
               <a:tblGrid>
-                <a:gridCol w="2814697">
+                <a:gridCol w="1629100">
                   <a:extLst>
                     <a:ext uri="{9D8B030D-6E8A-4147-A177-3AD203B41FA5}">
                       <a16:colId xmlns:a16="http://schemas.microsoft.com/office/drawing/2014/main" val="510767988"/>
                     </a:ext>
                   </a:extLst>
                 </a:gridCol>
-                <a:gridCol w="2814697">
+                <a:gridCol w="5112912">
                   <a:extLst>
                     <a:ext uri="{9D8B030D-6E8A-4147-A177-3AD203B41FA5}">
                       <a16:colId xmlns:a16="http://schemas.microsoft.com/office/drawing/2014/main" val="2980862712"/>
                     </a:ext>
                   </a:extLst>
                 </a:gridCol>
-                <a:gridCol w="2814697">
+                <a:gridCol w="1702079">
                   <a:extLst>
                     <a:ext uri="{9D8B030D-6E8A-4147-A177-3AD203B41FA5}">
                       <a16:colId xmlns:a16="http://schemas.microsoft.com/office/drawing/2014/main" val="1776980406"/>

</xml_diff>